<commit_message>
new papers to read
</commit_message>
<xml_diff>
--- a/Discuss/AohuaCheng_STDP.pptx
+++ b/Discuss/AohuaCheng_STDP.pptx
@@ -260,7 +260,7 @@
       <p15:sldGuideLst xmlns:p15="http://schemas.microsoft.com/office/powerpoint/2012/main"/>
     </p:ext>
     <p:ext uri="http://customooxmlschemas.google.com/">
-      <go:slidesCustomData xmlns="" xmlns:mc="http://schemas.openxmlformats.org/markup-compatibility/2006" xmlns:mv="urn:schemas-microsoft-com:mac:vml" xmlns:c="http://schemas.openxmlformats.org/drawingml/2006/chart" xmlns:dgm="http://schemas.openxmlformats.org/drawingml/2006/diagram" xmlns:o="urn:schemas-microsoft-com:office:office" xmlns:v="urn:schemas-microsoft-com:vml" xmlns:pvml="urn:schemas-microsoft-com:office:powerpoint" xmlns:com="http://schemas.openxmlformats.org/drawingml/2006/compatibility" xmlns:p14="http://schemas.microsoft.com/office/powerpoint/2010/main" xmlns:p15="http://schemas.microsoft.com/office/powerpoint/2012/main" xmlns:ahyp="http://schemas.microsoft.com/office/drawing/2018/hyperlinkcolor" xmlns:go="http://customooxmlschemas.google.com/" r:id="rId18" roundtripDataSignature="AMtx7mginj5P1OjKcxYlJPh/VZA42S4F5Q=="/>
+      <go:slidesCustomData xmlns:go="http://customooxmlschemas.google.com/" xmlns:ahyp="http://schemas.microsoft.com/office/drawing/2018/hyperlinkcolor" xmlns:p15="http://schemas.microsoft.com/office/powerpoint/2012/main" xmlns:p14="http://schemas.microsoft.com/office/powerpoint/2010/main" xmlns:com="http://schemas.openxmlformats.org/drawingml/2006/compatibility" xmlns:pvml="urn:schemas-microsoft-com:office:powerpoint" xmlns:v="urn:schemas-microsoft-com:vml" xmlns:o="urn:schemas-microsoft-com:office:office" xmlns:dgm="http://schemas.openxmlformats.org/drawingml/2006/diagram" xmlns:c="http://schemas.openxmlformats.org/drawingml/2006/chart" xmlns:mv="urn:schemas-microsoft-com:mac:vml" xmlns:mc="http://schemas.openxmlformats.org/markup-compatibility/2006" xmlns="" r:id="rId18" roundtripDataSignature="AMtx7mginj5P1OjKcxYlJPh/VZA42S4F5Q=="/>
     </p:ext>
   </p:extLst>
 </p:presentation>
@@ -15639,8 +15639,8 @@
           </a:prstGeom>
         </p:spPr>
       </p:pic>
-      <mc:AlternateContent xmlns:mc="http://schemas.openxmlformats.org/markup-compatibility/2006">
-        <mc:Choice xmlns:a14="http://schemas.microsoft.com/office/drawing/2010/main" Requires="a14">
+      <mc:AlternateContent xmlns:mc="http://schemas.openxmlformats.org/markup-compatibility/2006" xmlns:a14="http://schemas.microsoft.com/office/drawing/2010/main">
+        <mc:Choice Requires="a14">
           <p:sp>
             <p:nvSpPr>
               <p:cNvPr id="14" name="Google Shape;105;ge9f2884d2e_2_8">
@@ -15708,16 +15708,7 @@
                           </a:solidFill>
                           <a:latin typeface="Cambria Math" panose="02040503050406030204" pitchFamily="18" charset="0"/>
                         </a:rPr>
-                        <m:t>16</m:t>
-                      </m:r>
-                      <m:r>
-                        <a:rPr lang="en-US" altLang="zh-CN" b="0" i="1" smtClean="0">
-                          <a:solidFill>
-                            <a:schemeClr val="dk1"/>
-                          </a:solidFill>
-                          <a:latin typeface="Cambria Math" panose="02040503050406030204" pitchFamily="18" charset="0"/>
-                        </a:rPr>
-                        <m:t>0</m:t>
+                        <m:t>160</m:t>
                       </m:r>
                       <m:r>
                         <a:rPr lang="en-US" altLang="zh-CN" i="1">
@@ -16097,7 +16088,7 @@
             </p:txBody>
           </p:sp>
         </mc:Choice>
-        <mc:Fallback>
+        <mc:Fallback xmlns="">
           <p:sp>
             <p:nvSpPr>
               <p:cNvPr id="14" name="Google Shape;105;ge9f2884d2e_2_8">
@@ -16571,8 +16562,8 @@
           </a:prstGeom>
         </p:spPr>
       </p:pic>
-      <mc:AlternateContent xmlns:mc="http://schemas.openxmlformats.org/markup-compatibility/2006">
-        <mc:Choice xmlns:a14="http://schemas.microsoft.com/office/drawing/2010/main" Requires="a14">
+      <mc:AlternateContent xmlns:mc="http://schemas.openxmlformats.org/markup-compatibility/2006" xmlns:a14="http://schemas.microsoft.com/office/drawing/2010/main">
+        <mc:Choice Requires="a14">
           <p:sp>
             <p:nvSpPr>
               <p:cNvPr id="13" name="Google Shape;105;ge9f2884d2e_2_8">
@@ -16640,16 +16631,7 @@
                           </a:solidFill>
                           <a:latin typeface="Cambria Math" panose="02040503050406030204" pitchFamily="18" charset="0"/>
                         </a:rPr>
-                        <m:t>16</m:t>
-                      </m:r>
-                      <m:r>
-                        <a:rPr lang="en-US" altLang="zh-CN" b="0" i="1" smtClean="0">
-                          <a:solidFill>
-                            <a:schemeClr val="dk1"/>
-                          </a:solidFill>
-                          <a:latin typeface="Cambria Math" panose="02040503050406030204" pitchFamily="18" charset="0"/>
-                        </a:rPr>
-                        <m:t>0</m:t>
+                        <m:t>160</m:t>
                       </m:r>
                       <m:r>
                         <a:rPr lang="en-US" altLang="zh-CN" i="1">
@@ -17029,7 +17011,7 @@
             </p:txBody>
           </p:sp>
         </mc:Choice>
-        <mc:Fallback>
+        <mc:Fallback xmlns="">
           <p:sp>
             <p:nvSpPr>
               <p:cNvPr id="13" name="Google Shape;105;ge9f2884d2e_2_8">
@@ -17448,8 +17430,8 @@
           </a:prstGeom>
         </p:spPr>
       </p:pic>
-      <mc:AlternateContent xmlns:mc="http://schemas.openxmlformats.org/markup-compatibility/2006">
-        <mc:Choice xmlns:a14="http://schemas.microsoft.com/office/drawing/2010/main" Requires="a14">
+      <mc:AlternateContent xmlns:mc="http://schemas.openxmlformats.org/markup-compatibility/2006" xmlns:a14="http://schemas.microsoft.com/office/drawing/2010/main">
+        <mc:Choice Requires="a14">
           <p:sp>
             <p:nvSpPr>
               <p:cNvPr id="13" name="Google Shape;105;ge9f2884d2e_2_8">
@@ -17517,16 +17499,7 @@
                           </a:solidFill>
                           <a:latin typeface="Cambria Math" panose="02040503050406030204" pitchFamily="18" charset="0"/>
                         </a:rPr>
-                        <m:t>16</m:t>
-                      </m:r>
-                      <m:r>
-                        <a:rPr lang="en-US" altLang="zh-CN" b="0" i="1" smtClean="0">
-                          <a:solidFill>
-                            <a:schemeClr val="dk1"/>
-                          </a:solidFill>
-                          <a:latin typeface="Cambria Math" panose="02040503050406030204" pitchFamily="18" charset="0"/>
-                        </a:rPr>
-                        <m:t>0</m:t>
+                        <m:t>160</m:t>
                       </m:r>
                       <m:r>
                         <a:rPr lang="en-US" altLang="zh-CN" i="1">
@@ -17906,7 +17879,7 @@
             </p:txBody>
           </p:sp>
         </mc:Choice>
-        <mc:Fallback>
+        <mc:Fallback xmlns="">
           <p:sp>
             <p:nvSpPr>
               <p:cNvPr id="13" name="Google Shape;105;ge9f2884d2e_2_8">
@@ -18165,7 +18138,7 @@
         <p:spPr>
           <a:xfrm>
             <a:off x="838200" y="1884694"/>
-            <a:ext cx="7326217" cy="2372927"/>
+            <a:ext cx="7326217" cy="1929729"/>
           </a:xfrm>
           <a:prstGeom prst="rect">
             <a:avLst/>
@@ -18195,34 +18168,15 @@
                   <a:schemeClr val="dk1"/>
                 </a:solidFill>
               </a:rPr>
-              <a:t>复现调参如何保证生物学意义？</a:t>
+              <a:t>这篇论文可能有用的地方：对</a:t>
             </a:r>
-          </a:p>
-          <a:p>
-            <a:pPr>
-              <a:lnSpc>
-                <a:spcPct val="115000"/>
-              </a:lnSpc>
-            </a:pPr>
-            <a:endParaRPr lang="en-US" altLang="zh-CN" sz="1800" dirty="0">
-              <a:solidFill>
-                <a:schemeClr val="dk1"/>
-              </a:solidFill>
-            </a:endParaRPr>
-          </a:p>
-          <a:p>
-            <a:pPr>
-              <a:lnSpc>
-                <a:spcPct val="115000"/>
-              </a:lnSpc>
-            </a:pPr>
             <a:r>
               <a:rPr lang="en-US" altLang="zh-CN" sz="1800" dirty="0">
                 <a:solidFill>
                   <a:schemeClr val="dk1"/>
                 </a:solidFill>
               </a:rPr>
-              <a:t>•  </a:t>
+              <a:t>synapse</a:t>
             </a:r>
             <a:r>
               <a:rPr lang="zh-CN" altLang="en-US" sz="1800" dirty="0">
@@ -18230,7 +18184,7 @@
                   <a:schemeClr val="dk1"/>
                 </a:solidFill>
               </a:rPr>
-              <a:t>学习的正向传递过程，如何使用</a:t>
+              <a:t>的建模，但是是</a:t>
             </a:r>
             <a:r>
               <a:rPr lang="en-US" altLang="zh-CN" sz="1800" dirty="0">
@@ -18238,7 +18192,23 @@
                   <a:schemeClr val="dk1"/>
                 </a:solidFill>
               </a:rPr>
-              <a:t>STDP</a:t>
+              <a:t>small-time-scale(</a:t>
+            </a:r>
+            <a:r>
+              <a:rPr lang="en-US" altLang="zh-CN" sz="1800" dirty="0" err="1">
+                <a:solidFill>
+                  <a:schemeClr val="dk1"/>
+                </a:solidFill>
+              </a:rPr>
+              <a:t>ms</a:t>
+            </a:r>
+            <a:r>
+              <a:rPr lang="en-US" altLang="zh-CN" sz="1800" dirty="0">
+                <a:solidFill>
+                  <a:schemeClr val="dk1"/>
+                </a:solidFill>
+              </a:rPr>
+              <a:t>), </a:t>
             </a:r>
             <a:r>
               <a:rPr lang="zh-CN" altLang="en-US" sz="1800" dirty="0">
@@ -18246,7 +18216,7 @@
                   <a:schemeClr val="dk1"/>
                 </a:solidFill>
               </a:rPr>
-              <a:t>？</a:t>
+              <a:t>我们需要</a:t>
             </a:r>
             <a:r>
               <a:rPr lang="en-US" altLang="zh-CN" sz="1800" dirty="0">
@@ -18254,7 +18224,7 @@
                   <a:schemeClr val="dk1"/>
                 </a:solidFill>
               </a:rPr>
-              <a:t>(</a:t>
+              <a:t>large-time-scale(hour)</a:t>
             </a:r>
             <a:r>
               <a:rPr lang="zh-CN" altLang="en-US" sz="1800" dirty="0">
@@ -18262,49 +18232,7 @@
                   <a:schemeClr val="dk1"/>
                 </a:solidFill>
               </a:rPr>
-              <a:t>暂时的想法</a:t>
-            </a:r>
-            <a:r>
-              <a:rPr lang="zh-CN" altLang="en-US" sz="1800" dirty="0">
-                <a:solidFill>
-                  <a:schemeClr val="dk1"/>
-                </a:solidFill>
-                <a:sym typeface="Wingdings" panose="05000000000000000000" pitchFamily="2" charset="2"/>
-              </a:rPr>
-              <a:t>：</a:t>
-            </a:r>
-            <a:r>
-              <a:rPr lang="en-US" altLang="zh-CN" sz="1800" dirty="0">
-                <a:solidFill>
-                  <a:schemeClr val="dk1"/>
-                </a:solidFill>
-                <a:sym typeface="Wingdings" panose="05000000000000000000" pitchFamily="2" charset="2"/>
-              </a:rPr>
-              <a:t>(</a:t>
-            </a:r>
-            <a:r>
-              <a:rPr lang="zh-CN" altLang="en-US" sz="1800" dirty="0">
-                <a:solidFill>
-                  <a:schemeClr val="dk1"/>
-                </a:solidFill>
-              </a:rPr>
-              <a:t>分层）</a:t>
-            </a:r>
-            <a:r>
-              <a:rPr lang="en-US" altLang="zh-CN" sz="1800" dirty="0">
-                <a:solidFill>
-                  <a:schemeClr val="dk1"/>
-                </a:solidFill>
-              </a:rPr>
-              <a:t>+</a:t>
-            </a:r>
-            <a:r>
-              <a:rPr lang="zh-CN" altLang="en-US" sz="1800" dirty="0">
-                <a:solidFill>
-                  <a:schemeClr val="dk1"/>
-                </a:solidFill>
-              </a:rPr>
-              <a:t>时序）</a:t>
+              <a:t>的神经元协同关系建模</a:t>
             </a:r>
             <a:endParaRPr lang="en-US" altLang="zh-CN" sz="1800" dirty="0">
               <a:solidFill>
@@ -18313,11 +18241,6 @@
             </a:endParaRPr>
           </a:p>
           <a:p>
-            <a:pPr>
-              <a:lnSpc>
-                <a:spcPct val="115000"/>
-              </a:lnSpc>
-            </a:pPr>
             <a:endParaRPr lang="en-US" altLang="zh-CN" sz="1800" dirty="0">
               <a:solidFill>
                 <a:schemeClr val="dk1"/>
@@ -18325,11 +18248,6 @@
             </a:endParaRPr>
           </a:p>
           <a:p>
-            <a:pPr>
-              <a:lnSpc>
-                <a:spcPct val="115000"/>
-              </a:lnSpc>
-            </a:pPr>
             <a:r>
               <a:rPr lang="en-US" altLang="zh-CN" sz="1800" dirty="0">
                 <a:solidFill>
@@ -18344,7 +18262,7 @@
                   <a:schemeClr val="dk1"/>
                 </a:solidFill>
               </a:rPr>
-              <a:t>网络权重</a:t>
+              <a:t>接下来的工作：读一些</a:t>
             </a:r>
             <a:r>
               <a:rPr lang="en-US" altLang="zh-CN" sz="1800" dirty="0">
@@ -18352,7 +18270,7 @@
                   <a:schemeClr val="dk1"/>
                 </a:solidFill>
               </a:rPr>
-              <a:t>w</a:t>
+              <a:t>review</a:t>
             </a:r>
             <a:r>
               <a:rPr lang="zh-CN" altLang="en-US" sz="1800" dirty="0">
@@ -18360,29 +18278,16 @@
                   <a:schemeClr val="dk1"/>
                 </a:solidFill>
               </a:rPr>
-              <a:t>更新如何体现在网络中？（发育，可能与</a:t>
+              <a:t>，注意</a:t>
             </a:r>
             <a:r>
-              <a:rPr lang="en-US" altLang="zh-CN" sz="1800" dirty="0" err="1">
+              <a:rPr lang="en-US" altLang="zh-CN" sz="1800" dirty="0">
                 <a:solidFill>
                   <a:schemeClr val="dk1"/>
                 </a:solidFill>
               </a:rPr>
-              <a:t>g_ampa</a:t>
+              <a:t>STP, LTP, Misha</a:t>
             </a:r>
-            <a:r>
-              <a:rPr lang="zh-CN" altLang="en-US" sz="1800" dirty="0">
-                <a:solidFill>
-                  <a:schemeClr val="dk1"/>
-                </a:solidFill>
-              </a:rPr>
-              <a:t>有关）</a:t>
-            </a:r>
-            <a:endParaRPr lang="en-US" altLang="zh-CN" sz="1800" dirty="0">
-              <a:solidFill>
-                <a:schemeClr val="dk1"/>
-              </a:solidFill>
-            </a:endParaRPr>
           </a:p>
           <a:p>
             <a:pPr>
@@ -20039,7 +19944,7 @@
                   <a:schemeClr val="dk1"/>
                 </a:solidFill>
               </a:rPr>
-              <a:t>Network: specific connectivity</a:t>
+              <a:t>STDP(small time scale)</a:t>
             </a:r>
           </a:p>
         </p:txBody>
@@ -20749,7 +20654,7 @@
                   <a:schemeClr val="dk1"/>
                 </a:solidFill>
               </a:rPr>
-              <a:t>Network class</a:t>
+              <a:t>Synapse class</a:t>
             </a:r>
           </a:p>
         </p:txBody>
@@ -20843,6 +20748,10 @@
           <a:lstStyle/>
           <a:p>
             <a:r>
+              <a:rPr lang="en-GB" altLang="zh-CN" dirty="0"/>
+              <a:t>Coding link: https://cloud.tsinghua.edu.cn/f/483f62bf23f84226a573</a:t>
+            </a:r>
+            <a:r>
               <a:rPr lang="en-GB" altLang="zh-CN" b="0" i="0" dirty="0">
                 <a:solidFill>
                   <a:srgbClr val="212529"/>
@@ -20850,9 +20759,52 @@
                 <a:effectLst/>
                 <a:latin typeface="-apple-system"/>
               </a:rPr>
-              <a:t>Coding link: https://cloud.tsinghua.edu.cn/f/483f62bf23f84226a573/</a:t>
+              <a:t>/</a:t>
             </a:r>
             <a:endParaRPr lang="zh-CN" altLang="en-US" dirty="0"/>
+          </a:p>
+        </p:txBody>
+      </p:sp>
+      <p:sp>
+        <p:nvSpPr>
+          <p:cNvPr id="12" name="文本框 11">
+            <a:extLst>
+              <a:ext uri="{FF2B5EF4-FFF2-40B4-BE49-F238E27FC236}">
+                <a16:creationId xmlns:a16="http://schemas.microsoft.com/office/drawing/2014/main" id="{E7488729-CF55-4E9A-B725-3C2FB98E13E0}"/>
+              </a:ext>
+            </a:extLst>
+          </p:cNvPr>
+          <p:cNvSpPr txBox="1"/>
+          <p:nvPr/>
+        </p:nvSpPr>
+        <p:spPr>
+          <a:xfrm>
+            <a:off x="709909" y="4995715"/>
+            <a:ext cx="6094520" cy="307777"/>
+          </a:xfrm>
+          <a:prstGeom prst="rect">
+            <a:avLst/>
+          </a:prstGeom>
+          <a:noFill/>
+        </p:spPr>
+        <p:txBody>
+          <a:bodyPr wrap="square">
+            <a:spAutoFit/>
+          </a:bodyPr>
+          <a:lstStyle/>
+          <a:p>
+            <a:r>
+              <a:rPr lang="en-US" altLang="zh-CN" dirty="0" err="1"/>
+              <a:t>Brainpy</a:t>
+            </a:r>
+            <a:r>
+              <a:rPr lang="en-US" altLang="zh-CN" dirty="0"/>
+              <a:t>: </a:t>
+            </a:r>
+            <a:r>
+              <a:rPr lang="zh-CN" altLang="en-US" dirty="0"/>
+              <a:t>https://brainpy.readthedocs.io/en/latest/</a:t>
+            </a:r>
           </a:p>
         </p:txBody>
       </p:sp>
@@ -21063,8 +21015,8 @@
           </a:p>
         </p:txBody>
       </p:sp>
-      <mc:AlternateContent xmlns:mc="http://schemas.openxmlformats.org/markup-compatibility/2006">
-        <mc:Choice xmlns:a14="http://schemas.microsoft.com/office/drawing/2010/main" Requires="a14">
+      <mc:AlternateContent xmlns:mc="http://schemas.openxmlformats.org/markup-compatibility/2006" xmlns:a14="http://schemas.microsoft.com/office/drawing/2010/main">
+        <mc:Choice Requires="a14">
           <p:sp>
             <p:nvSpPr>
               <p:cNvPr id="14" name="Google Shape;105;ge9f2884d2e_2_8">
@@ -21132,16 +21084,7 @@
                           </a:solidFill>
                           <a:latin typeface="Cambria Math" panose="02040503050406030204" pitchFamily="18" charset="0"/>
                         </a:rPr>
-                        <m:t>2</m:t>
-                      </m:r>
-                      <m:r>
-                        <a:rPr lang="en-US" altLang="zh-CN" b="0" i="1" smtClean="0">
-                          <a:solidFill>
-                            <a:schemeClr val="dk1"/>
-                          </a:solidFill>
-                          <a:latin typeface="Cambria Math" panose="02040503050406030204" pitchFamily="18" charset="0"/>
-                        </a:rPr>
-                        <m:t>0</m:t>
+                        <m:t>20</m:t>
                       </m:r>
                       <m:r>
                         <a:rPr lang="en-US" altLang="zh-CN" i="1">
@@ -21464,25 +21407,7 @@
                           </a:solidFill>
                           <a:latin typeface="Cambria Math" panose="02040503050406030204" pitchFamily="18" charset="0"/>
                         </a:rPr>
-                        <m:t>=</m:t>
-                      </m:r>
-                      <m:r>
-                        <a:rPr lang="en-US" altLang="zh-CN" b="0" i="1" smtClean="0">
-                          <a:solidFill>
-                            <a:schemeClr val="dk1"/>
-                          </a:solidFill>
-                          <a:latin typeface="Cambria Math" panose="02040503050406030204" pitchFamily="18" charset="0"/>
-                        </a:rPr>
-                        <m:t>1</m:t>
-                      </m:r>
-                      <m:r>
-                        <a:rPr lang="en-US" altLang="zh-CN" b="0" i="1" smtClean="0">
-                          <a:solidFill>
-                            <a:schemeClr val="dk1"/>
-                          </a:solidFill>
-                          <a:latin typeface="Cambria Math" panose="02040503050406030204" pitchFamily="18" charset="0"/>
-                        </a:rPr>
-                        <m:t>0 </m:t>
+                        <m:t>=10 </m:t>
                       </m:r>
                       <m:r>
                         <a:rPr lang="en-US" altLang="zh-CN" b="0" i="1" smtClean="0">
@@ -21543,16 +21468,7 @@
                           </a:solidFill>
                           <a:latin typeface="Cambria Math" panose="02040503050406030204" pitchFamily="18" charset="0"/>
                         </a:rPr>
-                        <m:t>=</m:t>
-                      </m:r>
-                      <m:r>
-                        <a:rPr lang="en-US" altLang="zh-CN" b="0" i="1" smtClean="0">
-                          <a:solidFill>
-                            <a:schemeClr val="dk1"/>
-                          </a:solidFill>
-                          <a:latin typeface="Cambria Math" panose="02040503050406030204" pitchFamily="18" charset="0"/>
-                        </a:rPr>
-                        <m:t>1, </m:t>
+                        <m:t>=1, </m:t>
                       </m:r>
                       <m:sSub>
                         <m:sSubPr>
@@ -21740,7 +21656,7 @@
             </p:txBody>
           </p:sp>
         </mc:Choice>
-        <mc:Fallback>
+        <mc:Fallback xmlns="">
           <p:sp>
             <p:nvSpPr>
               <p:cNvPr id="14" name="Google Shape;105;ge9f2884d2e_2_8">
@@ -22658,8 +22574,8 @@
           </a:prstGeom>
         </p:spPr>
       </p:pic>
-      <mc:AlternateContent xmlns:mc="http://schemas.openxmlformats.org/markup-compatibility/2006">
-        <mc:Choice xmlns:a14="http://schemas.microsoft.com/office/drawing/2010/main" Requires="a14">
+      <mc:AlternateContent xmlns:mc="http://schemas.openxmlformats.org/markup-compatibility/2006" xmlns:a14="http://schemas.microsoft.com/office/drawing/2010/main">
+        <mc:Choice Requires="a14">
           <p:sp>
             <p:nvSpPr>
               <p:cNvPr id="12" name="Google Shape;105;ge9f2884d2e_2_8">
@@ -22727,16 +22643,7 @@
                           </a:solidFill>
                           <a:latin typeface="Cambria Math" panose="02040503050406030204" pitchFamily="18" charset="0"/>
                         </a:rPr>
-                        <m:t>16</m:t>
-                      </m:r>
-                      <m:r>
-                        <a:rPr lang="en-US" altLang="zh-CN" b="0" i="1" smtClean="0">
-                          <a:solidFill>
-                            <a:schemeClr val="dk1"/>
-                          </a:solidFill>
-                          <a:latin typeface="Cambria Math" panose="02040503050406030204" pitchFamily="18" charset="0"/>
-                        </a:rPr>
-                        <m:t>0</m:t>
+                        <m:t>160</m:t>
                       </m:r>
                       <m:r>
                         <a:rPr lang="en-US" altLang="zh-CN" i="1">
@@ -23116,7 +23023,7 @@
             </p:txBody>
           </p:sp>
         </mc:Choice>
-        <mc:Fallback>
+        <mc:Fallback xmlns="">
           <p:sp>
             <p:nvSpPr>
               <p:cNvPr id="12" name="Google Shape;105;ge9f2884d2e_2_8">
@@ -23483,8 +23390,8 @@
           </a:extLst>
         </p:spPr>
       </p:pic>
-      <mc:AlternateContent xmlns:mc="http://schemas.openxmlformats.org/markup-compatibility/2006">
-        <mc:Choice xmlns:a14="http://schemas.microsoft.com/office/drawing/2010/main" Requires="a14">
+      <mc:AlternateContent xmlns:mc="http://schemas.openxmlformats.org/markup-compatibility/2006" xmlns:a14="http://schemas.microsoft.com/office/drawing/2010/main">
+        <mc:Choice Requires="a14">
           <p:sp>
             <p:nvSpPr>
               <p:cNvPr id="11" name="Google Shape;105;ge9f2884d2e_2_8">
@@ -23552,16 +23459,7 @@
                           </a:solidFill>
                           <a:latin typeface="Cambria Math" panose="02040503050406030204" pitchFamily="18" charset="0"/>
                         </a:rPr>
-                        <m:t>16</m:t>
-                      </m:r>
-                      <m:r>
-                        <a:rPr lang="en-US" altLang="zh-CN" b="0" i="1" smtClean="0">
-                          <a:solidFill>
-                            <a:schemeClr val="dk1"/>
-                          </a:solidFill>
-                          <a:latin typeface="Cambria Math" panose="02040503050406030204" pitchFamily="18" charset="0"/>
-                        </a:rPr>
-                        <m:t>0</m:t>
+                        <m:t>160</m:t>
                       </m:r>
                       <m:r>
                         <a:rPr lang="en-US" altLang="zh-CN" i="1">
@@ -23941,7 +23839,7 @@
             </p:txBody>
           </p:sp>
         </mc:Choice>
-        <mc:Fallback>
+        <mc:Fallback xmlns="">
           <p:sp>
             <p:nvSpPr>
               <p:cNvPr id="11" name="Google Shape;105;ge9f2884d2e_2_8">

</xml_diff>